<commit_message>
organize and add more example
</commit_message>
<xml_diff>
--- a/src/test/resources/samples/ms_office/Dickinson_Template_red.pptx
+++ b/src/test/resources/samples/ms_office/Dickinson_Template_red.pptx
@@ -5,8 +5,12 @@
     <p:sldMasterId id="2147483648" r:id="rId1"/>
   </p:sldMasterIdLst>
   <p:notesMasterIdLst>
-    <p:notesMasterId r:id="rId2"/>
+    <p:notesMasterId r:id="rId4"/>
   </p:notesMasterIdLst>
+  <p:sldIdLst>
+    <p:sldId id="256" r:id="rId2"/>
+    <p:sldId id="257" r:id="rId3"/>
+  </p:sldIdLst>
   <p:sldSz cx="9144000" cy="6858000" type="screen4x3"/>
   <p:notesSz cx="6858000" cy="9144000"/>
   <p:defaultTextStyle>
@@ -104,6 +108,22 @@
       </a:defRPr>
     </a:lvl9pPr>
   </p:defaultTextStyle>
+  <p:extLst>
+    <p:ext uri="{EFAFB233-063F-42B5-8137-9DF3F51BA10A}">
+      <p15:sldGuideLst xmlns:p15="http://schemas.microsoft.com/office/powerpoint/2012/main">
+        <p15:guide id="1" orient="horz" pos="2160">
+          <p15:clr>
+            <a:srgbClr val="A4A3A4"/>
+          </p15:clr>
+        </p15:guide>
+        <p15:guide id="2" pos="2880">
+          <p15:clr>
+            <a:srgbClr val="A4A3A4"/>
+          </p15:clr>
+        </p15:guide>
+      </p15:sldGuideLst>
+    </p:ext>
+  </p:extLst>
 </p:presentation>
 </file>
 
@@ -190,7 +210,7 @@
             <a:fld id="{E648A18B-8F7A-4331-888D-6F69B2F60007}" type="datetimeFigureOut">
               <a:rPr lang="en-US" smtClean="0"/>
               <a:pPr/>
-              <a:t>1/17/2013</a:t>
+              <a:t>9/4/2024</a:t>
             </a:fld>
             <a:endParaRPr lang="en-US"/>
           </a:p>
@@ -256,38 +276,37 @@
           <a:p>
             <a:pPr lvl="0"/>
             <a:r>
-              <a:rPr lang="en-US" smtClean="0"/>
+              <a:rPr lang="en-US"/>
               <a:t>Click to edit Master text styles</a:t>
             </a:r>
           </a:p>
           <a:p>
             <a:pPr lvl="1"/>
             <a:r>
-              <a:rPr lang="en-US" smtClean="0"/>
+              <a:rPr lang="en-US"/>
               <a:t>Second level</a:t>
             </a:r>
           </a:p>
           <a:p>
             <a:pPr lvl="2"/>
             <a:r>
-              <a:rPr lang="en-US" smtClean="0"/>
+              <a:rPr lang="en-US"/>
               <a:t>Third level</a:t>
             </a:r>
           </a:p>
           <a:p>
             <a:pPr lvl="3"/>
             <a:r>
-              <a:rPr lang="en-US" smtClean="0"/>
+              <a:rPr lang="en-US"/>
               <a:t>Fourth level</a:t>
             </a:r>
           </a:p>
           <a:p>
             <a:pPr lvl="4"/>
             <a:r>
-              <a:rPr lang="en-US" smtClean="0"/>
+              <a:rPr lang="en-US"/>
               <a:t>Fifth level</a:t>
             </a:r>
-            <a:endParaRPr lang="en-US"/>
           </a:p>
         </p:txBody>
       </p:sp>
@@ -519,10 +538,9 @@
           </a:lstStyle>
           <a:p>
             <a:r>
-              <a:rPr lang="en-US" dirty="0" smtClean="0"/>
+              <a:rPr lang="en-US" dirty="0"/>
               <a:t>Presentation Title</a:t>
             </a:r>
-            <a:endParaRPr lang="en-US" dirty="0"/>
           </a:p>
         </p:txBody>
       </p:sp>
@@ -640,34 +658,34 @@
           </a:lstStyle>
           <a:p>
             <a:r>
-              <a:rPr lang="en-US" dirty="0" smtClean="0"/>
+              <a:rPr lang="en-US" dirty="0"/>
               <a:t>Author</a:t>
             </a:r>
             <a:br>
-              <a:rPr lang="en-US" dirty="0" smtClean="0"/>
+              <a:rPr lang="en-US" dirty="0"/>
             </a:br>
             <a:r>
-              <a:rPr lang="en-US" dirty="0" smtClean="0"/>
+              <a:rPr lang="en-US" dirty="0"/>
               <a:t>Department</a:t>
             </a:r>
             <a:br>
-              <a:rPr lang="en-US" dirty="0" smtClean="0"/>
+              <a:rPr lang="en-US" dirty="0"/>
             </a:br>
             <a:r>
-              <a:rPr lang="en-US" dirty="0" smtClean="0"/>
+              <a:rPr lang="en-US" dirty="0"/>
               <a:t>Date</a:t>
             </a:r>
             <a:br>
-              <a:rPr lang="en-US" dirty="0" smtClean="0"/>
+              <a:rPr lang="en-US" dirty="0"/>
             </a:br>
             <a:r>
-              <a:rPr lang="en-US" dirty="0" smtClean="0"/>
+              <a:rPr lang="en-US" dirty="0"/>
               <a:t>Location</a:t>
             </a:r>
           </a:p>
           <a:p>
             <a:r>
-              <a:rPr lang="en-US" dirty="0" smtClean="0"/>
+              <a:rPr lang="en-US" dirty="0"/>
               <a:t>Other Information</a:t>
             </a:r>
           </a:p>
@@ -712,416 +730,6 @@
 </file>
 
 <file path=ppt/slideLayouts/slideLayout2.xml><?xml version="1.0" encoding="utf-8"?>
-<p:sldLayout xmlns:a="http://schemas.openxmlformats.org/drawingml/2006/main" xmlns:r="http://schemas.openxmlformats.org/officeDocument/2006/relationships" xmlns:p="http://schemas.openxmlformats.org/presentationml/2006/main" preserve="1" userDrawn="1">
-  <p:cSld name="Title and Content">
-    <p:spTree>
-      <p:nvGrpSpPr>
-        <p:cNvPr id="1" name=""/>
-        <p:cNvGrpSpPr/>
-        <p:nvPr/>
-      </p:nvGrpSpPr>
-      <p:grpSpPr>
-        <a:xfrm>
-          <a:off x="0" y="0"/>
-          <a:ext cx="0" cy="0"/>
-          <a:chOff x="0" y="0"/>
-          <a:chExt cx="0" cy="0"/>
-        </a:xfrm>
-      </p:grpSpPr>
-      <p:sp>
-        <p:nvSpPr>
-          <p:cNvPr id="2" name="Title 1"/>
-          <p:cNvSpPr>
-            <a:spLocks noGrp="1"/>
-          </p:cNvSpPr>
-          <p:nvPr>
-            <p:ph type="title" hasCustomPrompt="1"/>
-          </p:nvPr>
-        </p:nvSpPr>
-        <p:spPr>
-          <a:xfrm>
-            <a:off x="533400" y="990600"/>
-            <a:ext cx="8153400" cy="533400"/>
-          </a:xfrm>
-        </p:spPr>
-        <p:txBody>
-          <a:bodyPr/>
-          <a:lstStyle>
-            <a:lvl1pPr>
-              <a:defRPr sz="2800"/>
-            </a:lvl1pPr>
-          </a:lstStyle>
-          <a:p>
-            <a:r>
-              <a:rPr lang="en-US" dirty="0" smtClean="0"/>
-              <a:t>Slide Title</a:t>
-            </a:r>
-            <a:br>
-              <a:rPr lang="en-US" dirty="0" smtClean="0"/>
-            </a:br>
-            <a:endParaRPr lang="en-US" dirty="0"/>
-          </a:p>
-        </p:txBody>
-      </p:sp>
-      <p:pic>
-        <p:nvPicPr>
-          <p:cNvPr id="4" name="Picture 3" descr="Dickinson_hoefler_186.eps"/>
-          <p:cNvPicPr>
-            <a:picLocks noChangeAspect="1"/>
-          </p:cNvPicPr>
-          <p:nvPr userDrawn="1"/>
-        </p:nvPicPr>
-        <p:blipFill>
-          <a:blip r:embed="rId2" cstate="print">
-            <a:extLst>
-              <a:ext uri="{28A0092B-C50C-407E-A947-70E740481C1C}">
-                <a14:useLocalDpi xmlns:a14="http://schemas.microsoft.com/office/drawing/2010/main" val="0"/>
-              </a:ext>
-            </a:extLst>
-          </a:blip>
-          <a:stretch>
-            <a:fillRect/>
-          </a:stretch>
-        </p:blipFill>
-        <p:spPr>
-          <a:xfrm>
-            <a:off x="593100" y="379361"/>
-            <a:ext cx="1566913" cy="309045"/>
-          </a:xfrm>
-          <a:prstGeom prst="rect">
-            <a:avLst/>
-          </a:prstGeom>
-        </p:spPr>
-      </p:pic>
-      <p:sp>
-        <p:nvSpPr>
-          <p:cNvPr id="6" name="Content Placeholder 5"/>
-          <p:cNvSpPr>
-            <a:spLocks noGrp="1"/>
-          </p:cNvSpPr>
-          <p:nvPr>
-            <p:ph sz="quarter" idx="10"/>
-          </p:nvPr>
-        </p:nvSpPr>
-        <p:spPr>
-          <a:xfrm>
-            <a:off x="533400" y="1676400"/>
-            <a:ext cx="8153400" cy="4419600"/>
-          </a:xfrm>
-        </p:spPr>
-        <p:txBody>
-          <a:bodyPr>
-            <a:normAutofit/>
-          </a:bodyPr>
-          <a:lstStyle>
-            <a:lvl1pPr marL="0" indent="0">
-              <a:defRPr sz="2000"/>
-            </a:lvl1pPr>
-            <a:lvl2pPr>
-              <a:buFont typeface="Arial" pitchFamily="34" charset="0"/>
-              <a:buChar char="•"/>
-              <a:defRPr sz="2000"/>
-            </a:lvl2pPr>
-            <a:lvl3pPr>
-              <a:buFont typeface="Arial" pitchFamily="34" charset="0"/>
-              <a:buChar char="•"/>
-              <a:defRPr sz="2000"/>
-            </a:lvl3pPr>
-            <a:lvl4pPr>
-              <a:buFont typeface="Arial" pitchFamily="34" charset="0"/>
-              <a:buChar char="•"/>
-              <a:defRPr sz="2000"/>
-            </a:lvl4pPr>
-            <a:lvl5pPr>
-              <a:buFont typeface="Arial" pitchFamily="34" charset="0"/>
-              <a:buChar char="•"/>
-              <a:defRPr sz="2000"/>
-            </a:lvl5pPr>
-          </a:lstStyle>
-          <a:p>
-            <a:pPr lvl="0"/>
-            <a:r>
-              <a:rPr lang="en-US" dirty="0" smtClean="0"/>
-              <a:t>Click to edit Master text styles</a:t>
-            </a:r>
-          </a:p>
-          <a:p>
-            <a:pPr lvl="1"/>
-            <a:r>
-              <a:rPr lang="en-US" dirty="0" smtClean="0"/>
-              <a:t>Second level</a:t>
-            </a:r>
-          </a:p>
-          <a:p>
-            <a:pPr lvl="2"/>
-            <a:r>
-              <a:rPr lang="en-US" dirty="0" smtClean="0"/>
-              <a:t>Third level</a:t>
-            </a:r>
-          </a:p>
-          <a:p>
-            <a:pPr lvl="3"/>
-            <a:r>
-              <a:rPr lang="en-US" dirty="0" smtClean="0"/>
-              <a:t>Fourth level</a:t>
-            </a:r>
-          </a:p>
-          <a:p>
-            <a:pPr lvl="4"/>
-            <a:r>
-              <a:rPr lang="en-US" dirty="0" smtClean="0"/>
-              <a:t>Fifth level</a:t>
-            </a:r>
-            <a:endParaRPr lang="en-US" dirty="0"/>
-          </a:p>
-        </p:txBody>
-      </p:sp>
-    </p:spTree>
-  </p:cSld>
-  <p:clrMapOvr>
-    <a:masterClrMapping/>
-  </p:clrMapOvr>
-</p:sldLayout>
-</file>
-
-<file path=ppt/slideLayouts/slideLayout3.xml><?xml version="1.0" encoding="utf-8"?>
-<p:sldLayout xmlns:a="http://schemas.openxmlformats.org/drawingml/2006/main" xmlns:r="http://schemas.openxmlformats.org/officeDocument/2006/relationships" xmlns:p="http://schemas.openxmlformats.org/presentationml/2006/main" preserve="1" userDrawn="1">
-  <p:cSld name="Title and List">
-    <p:spTree>
-      <p:nvGrpSpPr>
-        <p:cNvPr id="1" name=""/>
-        <p:cNvGrpSpPr/>
-        <p:nvPr/>
-      </p:nvGrpSpPr>
-      <p:grpSpPr>
-        <a:xfrm>
-          <a:off x="0" y="0"/>
-          <a:ext cx="0" cy="0"/>
-          <a:chOff x="0" y="0"/>
-          <a:chExt cx="0" cy="0"/>
-        </a:xfrm>
-      </p:grpSpPr>
-      <p:sp>
-        <p:nvSpPr>
-          <p:cNvPr id="2" name="Title 1"/>
-          <p:cNvSpPr>
-            <a:spLocks noGrp="1"/>
-          </p:cNvSpPr>
-          <p:nvPr>
-            <p:ph type="title" hasCustomPrompt="1"/>
-          </p:nvPr>
-        </p:nvSpPr>
-        <p:spPr>
-          <a:xfrm>
-            <a:off x="533400" y="990600"/>
-            <a:ext cx="8153400" cy="533400"/>
-          </a:xfrm>
-        </p:spPr>
-        <p:txBody>
-          <a:bodyPr/>
-          <a:lstStyle>
-            <a:lvl1pPr>
-              <a:defRPr sz="2800"/>
-            </a:lvl1pPr>
-          </a:lstStyle>
-          <a:p>
-            <a:r>
-              <a:rPr lang="en-US" dirty="0" smtClean="0"/>
-              <a:t>List Title</a:t>
-            </a:r>
-            <a:br>
-              <a:rPr lang="en-US" dirty="0" smtClean="0"/>
-            </a:br>
-            <a:endParaRPr lang="en-US" dirty="0"/>
-          </a:p>
-        </p:txBody>
-      </p:sp>
-      <p:pic>
-        <p:nvPicPr>
-          <p:cNvPr id="4" name="Picture 3" descr="Dickinson_hoefler_186.eps"/>
-          <p:cNvPicPr>
-            <a:picLocks noChangeAspect="1"/>
-          </p:cNvPicPr>
-          <p:nvPr userDrawn="1"/>
-        </p:nvPicPr>
-        <p:blipFill>
-          <a:blip r:embed="rId2" cstate="print">
-            <a:extLst>
-              <a:ext uri="{28A0092B-C50C-407E-A947-70E740481C1C}">
-                <a14:useLocalDpi xmlns:a14="http://schemas.microsoft.com/office/drawing/2010/main" val="0"/>
-              </a:ext>
-            </a:extLst>
-          </a:blip>
-          <a:stretch>
-            <a:fillRect/>
-          </a:stretch>
-        </p:blipFill>
-        <p:spPr>
-          <a:xfrm>
-            <a:off x="593100" y="379361"/>
-            <a:ext cx="1566913" cy="309045"/>
-          </a:xfrm>
-          <a:prstGeom prst="rect">
-            <a:avLst/>
-          </a:prstGeom>
-        </p:spPr>
-      </p:pic>
-      <p:sp>
-        <p:nvSpPr>
-          <p:cNvPr id="6" name="Text Placeholder 5"/>
-          <p:cNvSpPr>
-            <a:spLocks noGrp="1"/>
-          </p:cNvSpPr>
-          <p:nvPr>
-            <p:ph type="body" sz="quarter" idx="10" hasCustomPrompt="1"/>
-          </p:nvPr>
-        </p:nvSpPr>
-        <p:spPr>
-          <a:xfrm>
-            <a:off x="533400" y="1676400"/>
-            <a:ext cx="8153400" cy="4572000"/>
-          </a:xfrm>
-        </p:spPr>
-        <p:txBody>
-          <a:bodyPr>
-            <a:normAutofit/>
-          </a:bodyPr>
-          <a:lstStyle>
-            <a:lvl1pPr marL="0" indent="0">
-              <a:buFont typeface="Arial" pitchFamily="34" charset="0"/>
-              <a:buChar char="•"/>
-              <a:defRPr sz="2000"/>
-            </a:lvl1pPr>
-            <a:lvl2pPr>
-              <a:defRPr sz="2000"/>
-            </a:lvl2pPr>
-            <a:lvl3pPr>
-              <a:defRPr sz="2000"/>
-            </a:lvl3pPr>
-            <a:lvl4pPr>
-              <a:defRPr sz="2000"/>
-            </a:lvl4pPr>
-            <a:lvl5pPr>
-              <a:defRPr sz="2000"/>
-            </a:lvl5pPr>
-          </a:lstStyle>
-          <a:p>
-            <a:pPr lvl="0"/>
-            <a:r>
-              <a:rPr lang="en-US" dirty="0" smtClean="0"/>
-              <a:t>Insert Text</a:t>
-            </a:r>
-          </a:p>
-        </p:txBody>
-      </p:sp>
-    </p:spTree>
-  </p:cSld>
-  <p:clrMapOvr>
-    <a:masterClrMapping/>
-  </p:clrMapOvr>
-</p:sldLayout>
-</file>
-
-<file path=ppt/slideLayouts/slideLayout4.xml><?xml version="1.0" encoding="utf-8"?>
-<p:sldLayout xmlns:a="http://schemas.openxmlformats.org/drawingml/2006/main" xmlns:r="http://schemas.openxmlformats.org/officeDocument/2006/relationships" xmlns:p="http://schemas.openxmlformats.org/presentationml/2006/main" preserve="1" userDrawn="1">
-  <p:cSld name="Section Title Page">
-    <p:spTree>
-      <p:nvGrpSpPr>
-        <p:cNvPr id="1" name=""/>
-        <p:cNvGrpSpPr/>
-        <p:nvPr/>
-      </p:nvGrpSpPr>
-      <p:grpSpPr>
-        <a:xfrm>
-          <a:off x="0" y="0"/>
-          <a:ext cx="0" cy="0"/>
-          <a:chOff x="0" y="0"/>
-          <a:chExt cx="0" cy="0"/>
-        </a:xfrm>
-      </p:grpSpPr>
-      <p:sp>
-        <p:nvSpPr>
-          <p:cNvPr id="2" name="Title 1"/>
-          <p:cNvSpPr>
-            <a:spLocks noGrp="1"/>
-          </p:cNvSpPr>
-          <p:nvPr>
-            <p:ph type="title" hasCustomPrompt="1"/>
-          </p:nvPr>
-        </p:nvSpPr>
-        <p:spPr>
-          <a:xfrm>
-            <a:off x="457200" y="2514600"/>
-            <a:ext cx="7772400" cy="1362075"/>
-          </a:xfrm>
-        </p:spPr>
-        <p:txBody>
-          <a:bodyPr anchor="t"/>
-          <a:lstStyle>
-            <a:lvl1pPr algn="l">
-              <a:defRPr sz="4000" b="1" cap="none" baseline="0"/>
-            </a:lvl1pPr>
-          </a:lstStyle>
-          <a:p>
-            <a:r>
-              <a:rPr lang="en-US" sz="3600" b="1" dirty="0" smtClean="0">
-                <a:solidFill>
-                  <a:srgbClr val="7F7F7F"/>
-                </a:solidFill>
-                <a:latin typeface="Arial"/>
-                <a:cs typeface="Arial"/>
-              </a:rPr>
-              <a:t>Section Title</a:t>
-            </a:r>
-            <a:endParaRPr lang="en-US" sz="3600" b="1" dirty="0">
-              <a:solidFill>
-                <a:srgbClr val="7F7F7F"/>
-              </a:solidFill>
-              <a:latin typeface="Arial"/>
-              <a:cs typeface="Arial"/>
-            </a:endParaRPr>
-          </a:p>
-        </p:txBody>
-      </p:sp>
-      <p:pic>
-        <p:nvPicPr>
-          <p:cNvPr id="3" name="Picture 2" descr="Dickinson_hoefler_186.eps"/>
-          <p:cNvPicPr>
-            <a:picLocks noChangeAspect="1"/>
-          </p:cNvPicPr>
-          <p:nvPr userDrawn="1"/>
-        </p:nvPicPr>
-        <p:blipFill>
-          <a:blip r:embed="rId2" cstate="print">
-            <a:extLst>
-              <a:ext uri="{28A0092B-C50C-407E-A947-70E740481C1C}">
-                <a14:useLocalDpi xmlns:a14="http://schemas.microsoft.com/office/drawing/2010/main" val="0"/>
-              </a:ext>
-            </a:extLst>
-          </a:blip>
-          <a:stretch>
-            <a:fillRect/>
-          </a:stretch>
-        </p:blipFill>
-        <p:spPr>
-          <a:xfrm>
-            <a:off x="593100" y="379361"/>
-            <a:ext cx="1566913" cy="309045"/>
-          </a:xfrm>
-          <a:prstGeom prst="rect">
-            <a:avLst/>
-          </a:prstGeom>
-        </p:spPr>
-      </p:pic>
-    </p:spTree>
-  </p:cSld>
-  <p:clrMapOvr>
-    <a:masterClrMapping/>
-  </p:clrMapOvr>
-</p:sldLayout>
-</file>
-
-<file path=ppt/slideLayouts/slideLayout5.xml><?xml version="1.0" encoding="utf-8"?>
 <p:sldLayout xmlns:a="http://schemas.openxmlformats.org/drawingml/2006/main" xmlns:r="http://schemas.openxmlformats.org/officeDocument/2006/relationships" xmlns:p="http://schemas.openxmlformats.org/presentationml/2006/main" type="objTx" preserve="1">
   <p:cSld name="Title and Content (Graph) With Notes">
     <p:spTree>
@@ -1165,10 +773,9 @@
           </a:lstStyle>
           <a:p>
             <a:r>
-              <a:rPr lang="en-US" dirty="0" smtClean="0"/>
+              <a:rPr lang="en-US" dirty="0"/>
               <a:t>Slide Title</a:t>
             </a:r>
-            <a:endParaRPr lang="en-US" dirty="0"/>
           </a:p>
         </p:txBody>
       </p:sp>
@@ -1232,38 +839,37 @@
           <a:p>
             <a:pPr lvl="0"/>
             <a:r>
-              <a:rPr lang="en-US" dirty="0" smtClean="0"/>
+              <a:rPr lang="en-US" dirty="0"/>
               <a:t>Insert text here</a:t>
             </a:r>
           </a:p>
           <a:p>
             <a:pPr lvl="1"/>
             <a:r>
-              <a:rPr lang="en-US" dirty="0" smtClean="0"/>
+              <a:rPr lang="en-US" dirty="0"/>
               <a:t>List first level</a:t>
             </a:r>
           </a:p>
           <a:p>
             <a:pPr lvl="2"/>
             <a:r>
-              <a:rPr lang="en-US" dirty="0" smtClean="0"/>
+              <a:rPr lang="en-US" dirty="0"/>
               <a:t>List second level</a:t>
             </a:r>
           </a:p>
           <a:p>
             <a:pPr lvl="3"/>
             <a:r>
-              <a:rPr lang="en-US" dirty="0" smtClean="0"/>
+              <a:rPr lang="en-US" dirty="0"/>
               <a:t>List third level</a:t>
             </a:r>
           </a:p>
           <a:p>
             <a:pPr lvl="4"/>
             <a:r>
-              <a:rPr lang="en-US" dirty="0" smtClean="0"/>
+              <a:rPr lang="en-US" dirty="0"/>
               <a:t>List fourth level</a:t>
             </a:r>
-            <a:endParaRPr lang="en-US" dirty="0"/>
           </a:p>
         </p:txBody>
       </p:sp>
@@ -1326,7 +932,7 @@
           <a:p>
             <a:pPr lvl="0"/>
             <a:r>
-              <a:rPr lang="en-US" dirty="0" smtClean="0"/>
+              <a:rPr lang="en-US" dirty="0"/>
               <a:t>Insert text here</a:t>
             </a:r>
           </a:p>
@@ -1335,603 +941,6 @@
       <p:pic>
         <p:nvPicPr>
           <p:cNvPr id="5" name="Picture 4" descr="Dickinson_hoefler_186.eps"/>
-          <p:cNvPicPr>
-            <a:picLocks noChangeAspect="1"/>
-          </p:cNvPicPr>
-          <p:nvPr userDrawn="1"/>
-        </p:nvPicPr>
-        <p:blipFill>
-          <a:blip r:embed="rId2" cstate="print">
-            <a:extLst>
-              <a:ext uri="{28A0092B-C50C-407E-A947-70E740481C1C}">
-                <a14:useLocalDpi xmlns:a14="http://schemas.microsoft.com/office/drawing/2010/main" val="0"/>
-              </a:ext>
-            </a:extLst>
-          </a:blip>
-          <a:stretch>
-            <a:fillRect/>
-          </a:stretch>
-        </p:blipFill>
-        <p:spPr>
-          <a:xfrm>
-            <a:off x="593100" y="379361"/>
-            <a:ext cx="1566913" cy="309045"/>
-          </a:xfrm>
-          <a:prstGeom prst="rect">
-            <a:avLst/>
-          </a:prstGeom>
-        </p:spPr>
-      </p:pic>
-    </p:spTree>
-  </p:cSld>
-  <p:clrMapOvr>
-    <a:masterClrMapping/>
-  </p:clrMapOvr>
-</p:sldLayout>
-</file>
-
-<file path=ppt/slideLayouts/slideLayout6.xml><?xml version="1.0" encoding="utf-8"?>
-<p:sldLayout xmlns:a="http://schemas.openxmlformats.org/drawingml/2006/main" xmlns:r="http://schemas.openxmlformats.org/officeDocument/2006/relationships" xmlns:p="http://schemas.openxmlformats.org/presentationml/2006/main" preserve="1" userDrawn="1">
-  <p:cSld name="Title and Text with Notes at Bottom">
-    <p:spTree>
-      <p:nvGrpSpPr>
-        <p:cNvPr id="1" name=""/>
-        <p:cNvGrpSpPr/>
-        <p:nvPr/>
-      </p:nvGrpSpPr>
-      <p:grpSpPr>
-        <a:xfrm>
-          <a:off x="0" y="0"/>
-          <a:ext cx="0" cy="0"/>
-          <a:chOff x="0" y="0"/>
-          <a:chExt cx="0" cy="0"/>
-        </a:xfrm>
-      </p:grpSpPr>
-      <p:sp>
-        <p:nvSpPr>
-          <p:cNvPr id="2" name="Title 1"/>
-          <p:cNvSpPr>
-            <a:spLocks noGrp="1"/>
-          </p:cNvSpPr>
-          <p:nvPr>
-            <p:ph type="title" hasCustomPrompt="1"/>
-          </p:nvPr>
-        </p:nvSpPr>
-        <p:spPr>
-          <a:xfrm>
-            <a:off x="533400" y="990600"/>
-            <a:ext cx="8077200" cy="552450"/>
-          </a:xfrm>
-        </p:spPr>
-        <p:txBody>
-          <a:bodyPr anchor="t">
-            <a:normAutofit/>
-          </a:bodyPr>
-          <a:lstStyle>
-            <a:lvl1pPr algn="l">
-              <a:defRPr sz="2800" b="1"/>
-            </a:lvl1pPr>
-          </a:lstStyle>
-          <a:p>
-            <a:r>
-              <a:rPr lang="en-US" dirty="0" smtClean="0"/>
-              <a:t>Slide Title</a:t>
-            </a:r>
-            <a:endParaRPr lang="en-US" dirty="0"/>
-          </a:p>
-        </p:txBody>
-      </p:sp>
-      <p:sp>
-        <p:nvSpPr>
-          <p:cNvPr id="4" name="Text Placeholder 3"/>
-          <p:cNvSpPr>
-            <a:spLocks noGrp="1"/>
-          </p:cNvSpPr>
-          <p:nvPr>
-            <p:ph type="body" sz="half" idx="2" hasCustomPrompt="1"/>
-          </p:nvPr>
-        </p:nvSpPr>
-        <p:spPr>
-          <a:xfrm>
-            <a:off x="533400" y="6019800"/>
-            <a:ext cx="8229600" cy="685799"/>
-          </a:xfrm>
-        </p:spPr>
-        <p:txBody>
-          <a:bodyPr/>
-          <a:lstStyle>
-            <a:lvl1pPr marL="0" indent="0">
-              <a:buNone/>
-              <a:defRPr sz="1400"/>
-            </a:lvl1pPr>
-            <a:lvl2pPr marL="457200" indent="0">
-              <a:buNone/>
-              <a:defRPr sz="1200"/>
-            </a:lvl2pPr>
-            <a:lvl3pPr marL="914400" indent="0">
-              <a:buNone/>
-              <a:defRPr sz="1000"/>
-            </a:lvl3pPr>
-            <a:lvl4pPr marL="1371600" indent="0">
-              <a:buNone/>
-              <a:defRPr sz="900"/>
-            </a:lvl4pPr>
-            <a:lvl5pPr marL="1828800" indent="0">
-              <a:buNone/>
-              <a:defRPr sz="900"/>
-            </a:lvl5pPr>
-            <a:lvl6pPr marL="2286000" indent="0">
-              <a:buNone/>
-              <a:defRPr sz="900"/>
-            </a:lvl6pPr>
-            <a:lvl7pPr marL="2743200" indent="0">
-              <a:buNone/>
-              <a:defRPr sz="900"/>
-            </a:lvl7pPr>
-            <a:lvl8pPr marL="3200400" indent="0">
-              <a:buNone/>
-              <a:defRPr sz="900"/>
-            </a:lvl8pPr>
-            <a:lvl9pPr marL="3657600" indent="0">
-              <a:buNone/>
-              <a:defRPr sz="900"/>
-            </a:lvl9pPr>
-          </a:lstStyle>
-          <a:p>
-            <a:pPr lvl="0"/>
-            <a:r>
-              <a:rPr lang="en-US" dirty="0" smtClean="0"/>
-              <a:t>Insert text here</a:t>
-            </a:r>
-          </a:p>
-        </p:txBody>
-      </p:sp>
-      <p:pic>
-        <p:nvPicPr>
-          <p:cNvPr id="5" name="Picture 4" descr="Dickinson_hoefler_186.eps"/>
-          <p:cNvPicPr>
-            <a:picLocks noChangeAspect="1"/>
-          </p:cNvPicPr>
-          <p:nvPr userDrawn="1"/>
-        </p:nvPicPr>
-        <p:blipFill>
-          <a:blip r:embed="rId2" cstate="print">
-            <a:extLst>
-              <a:ext uri="{28A0092B-C50C-407E-A947-70E740481C1C}">
-                <a14:useLocalDpi xmlns:a14="http://schemas.microsoft.com/office/drawing/2010/main" val="0"/>
-              </a:ext>
-            </a:extLst>
-          </a:blip>
-          <a:stretch>
-            <a:fillRect/>
-          </a:stretch>
-        </p:blipFill>
-        <p:spPr>
-          <a:xfrm>
-            <a:off x="593100" y="379361"/>
-            <a:ext cx="1566913" cy="309045"/>
-          </a:xfrm>
-          <a:prstGeom prst="rect">
-            <a:avLst/>
-          </a:prstGeom>
-        </p:spPr>
-      </p:pic>
-      <p:sp>
-        <p:nvSpPr>
-          <p:cNvPr id="7" name="Text Placeholder 6"/>
-          <p:cNvSpPr>
-            <a:spLocks noGrp="1"/>
-          </p:cNvSpPr>
-          <p:nvPr>
-            <p:ph type="body" sz="quarter" idx="10" hasCustomPrompt="1"/>
-          </p:nvPr>
-        </p:nvSpPr>
-        <p:spPr>
-          <a:xfrm>
-            <a:off x="533400" y="1676400"/>
-            <a:ext cx="8077200" cy="4114800"/>
-          </a:xfrm>
-        </p:spPr>
-        <p:txBody>
-          <a:bodyPr>
-            <a:normAutofit/>
-          </a:bodyPr>
-          <a:lstStyle>
-            <a:lvl1pPr marL="0" indent="0">
-              <a:defRPr sz="2000"/>
-            </a:lvl1pPr>
-            <a:lvl2pPr>
-              <a:buFont typeface="Arial" pitchFamily="34" charset="0"/>
-              <a:buChar char="•"/>
-              <a:defRPr sz="2000"/>
-            </a:lvl2pPr>
-            <a:lvl3pPr>
-              <a:buFont typeface="Arial" pitchFamily="34" charset="0"/>
-              <a:buChar char="•"/>
-              <a:defRPr sz="2000"/>
-            </a:lvl3pPr>
-            <a:lvl4pPr>
-              <a:buFont typeface="Arial" pitchFamily="34" charset="0"/>
-              <a:buChar char="•"/>
-              <a:defRPr sz="2000"/>
-            </a:lvl4pPr>
-            <a:lvl5pPr>
-              <a:buFont typeface="Arial" pitchFamily="34" charset="0"/>
-              <a:buChar char="•"/>
-              <a:defRPr sz="2000"/>
-            </a:lvl5pPr>
-          </a:lstStyle>
-          <a:p>
-            <a:pPr lvl="0"/>
-            <a:r>
-              <a:rPr lang="en-US" dirty="0" smtClean="0"/>
-              <a:t>Insert text here</a:t>
-            </a:r>
-          </a:p>
-          <a:p>
-            <a:pPr lvl="1"/>
-            <a:r>
-              <a:rPr lang="en-US" dirty="0" smtClean="0"/>
-              <a:t>List first level</a:t>
-            </a:r>
-          </a:p>
-          <a:p>
-            <a:pPr lvl="2"/>
-            <a:r>
-              <a:rPr lang="en-US" dirty="0" smtClean="0"/>
-              <a:t>List second level</a:t>
-            </a:r>
-          </a:p>
-          <a:p>
-            <a:pPr lvl="3"/>
-            <a:r>
-              <a:rPr lang="en-US" dirty="0" smtClean="0"/>
-              <a:t>List third level</a:t>
-            </a:r>
-          </a:p>
-          <a:p>
-            <a:pPr lvl="4"/>
-            <a:r>
-              <a:rPr lang="en-US" dirty="0" smtClean="0"/>
-              <a:t>List fourth level</a:t>
-            </a:r>
-            <a:endParaRPr lang="en-US" dirty="0"/>
-          </a:p>
-        </p:txBody>
-      </p:sp>
-    </p:spTree>
-  </p:cSld>
-  <p:clrMapOvr>
-    <a:masterClrMapping/>
-  </p:clrMapOvr>
-</p:sldLayout>
-</file>
-
-<file path=ppt/slideLayouts/slideLayout7.xml><?xml version="1.0" encoding="utf-8"?>
-<p:sldLayout xmlns:a="http://schemas.openxmlformats.org/drawingml/2006/main" xmlns:r="http://schemas.openxmlformats.org/officeDocument/2006/relationships" xmlns:p="http://schemas.openxmlformats.org/presentationml/2006/main" type="titleOnly" preserve="1">
-  <p:cSld name="Title Only">
-    <p:spTree>
-      <p:nvGrpSpPr>
-        <p:cNvPr id="1" name=""/>
-        <p:cNvGrpSpPr/>
-        <p:nvPr/>
-      </p:nvGrpSpPr>
-      <p:grpSpPr>
-        <a:xfrm>
-          <a:off x="0" y="0"/>
-          <a:ext cx="0" cy="0"/>
-          <a:chOff x="0" y="0"/>
-          <a:chExt cx="0" cy="0"/>
-        </a:xfrm>
-      </p:grpSpPr>
-      <p:sp>
-        <p:nvSpPr>
-          <p:cNvPr id="2" name="Title 1"/>
-          <p:cNvSpPr>
-            <a:spLocks noGrp="1"/>
-          </p:cNvSpPr>
-          <p:nvPr>
-            <p:ph type="title" hasCustomPrompt="1"/>
-          </p:nvPr>
-        </p:nvSpPr>
-        <p:spPr/>
-        <p:txBody>
-          <a:bodyPr/>
-          <a:lstStyle>
-            <a:lvl1pPr>
-              <a:defRPr sz="2800"/>
-            </a:lvl1pPr>
-          </a:lstStyle>
-          <a:p>
-            <a:r>
-              <a:rPr lang="en-US" dirty="0" smtClean="0"/>
-              <a:t>Slide Title</a:t>
-            </a:r>
-            <a:br>
-              <a:rPr lang="en-US" dirty="0" smtClean="0"/>
-            </a:br>
-            <a:endParaRPr lang="en-US" dirty="0"/>
-          </a:p>
-        </p:txBody>
-      </p:sp>
-      <p:pic>
-        <p:nvPicPr>
-          <p:cNvPr id="3" name="Picture 2" descr="Dickinson_hoefler_186.eps"/>
-          <p:cNvPicPr>
-            <a:picLocks noChangeAspect="1"/>
-          </p:cNvPicPr>
-          <p:nvPr userDrawn="1"/>
-        </p:nvPicPr>
-        <p:blipFill>
-          <a:blip r:embed="rId2" cstate="print">
-            <a:extLst>
-              <a:ext uri="{28A0092B-C50C-407E-A947-70E740481C1C}">
-                <a14:useLocalDpi xmlns:a14="http://schemas.microsoft.com/office/drawing/2010/main" val="0"/>
-              </a:ext>
-            </a:extLst>
-          </a:blip>
-          <a:stretch>
-            <a:fillRect/>
-          </a:stretch>
-        </p:blipFill>
-        <p:spPr>
-          <a:xfrm>
-            <a:off x="593100" y="379361"/>
-            <a:ext cx="1566913" cy="309045"/>
-          </a:xfrm>
-          <a:prstGeom prst="rect">
-            <a:avLst/>
-          </a:prstGeom>
-        </p:spPr>
-      </p:pic>
-    </p:spTree>
-  </p:cSld>
-  <p:clrMapOvr>
-    <a:masterClrMapping/>
-  </p:clrMapOvr>
-</p:sldLayout>
-</file>
-
-<file path=ppt/slideLayouts/slideLayout8.xml><?xml version="1.0" encoding="utf-8"?>
-<p:sldLayout xmlns:a="http://schemas.openxmlformats.org/drawingml/2006/main" xmlns:r="http://schemas.openxmlformats.org/officeDocument/2006/relationships" xmlns:p="http://schemas.openxmlformats.org/presentationml/2006/main" preserve="1" userDrawn="1">
-  <p:cSld name="Picture with Caption">
-    <p:spTree>
-      <p:nvGrpSpPr>
-        <p:cNvPr id="1" name=""/>
-        <p:cNvGrpSpPr/>
-        <p:nvPr/>
-      </p:nvGrpSpPr>
-      <p:grpSpPr>
-        <a:xfrm>
-          <a:off x="0" y="0"/>
-          <a:ext cx="0" cy="0"/>
-          <a:chOff x="0" y="0"/>
-          <a:chExt cx="0" cy="0"/>
-        </a:xfrm>
-      </p:grpSpPr>
-      <p:sp>
-        <p:nvSpPr>
-          <p:cNvPr id="3" name="Picture Placeholder 2"/>
-          <p:cNvSpPr>
-            <a:spLocks noGrp="1"/>
-          </p:cNvSpPr>
-          <p:nvPr>
-            <p:ph type="pic" idx="1"/>
-          </p:nvPr>
-        </p:nvSpPr>
-        <p:spPr>
-          <a:xfrm>
-            <a:off x="609600" y="1676400"/>
-            <a:ext cx="8001000" cy="4495800"/>
-          </a:xfrm>
-        </p:spPr>
-        <p:txBody>
-          <a:bodyPr/>
-          <a:lstStyle>
-            <a:lvl1pPr marL="0" indent="0">
-              <a:buNone/>
-              <a:defRPr sz="3200"/>
-            </a:lvl1pPr>
-            <a:lvl2pPr marL="457200" indent="0">
-              <a:buNone/>
-              <a:defRPr sz="2800"/>
-            </a:lvl2pPr>
-            <a:lvl3pPr marL="914400" indent="0">
-              <a:buNone/>
-              <a:defRPr sz="2400"/>
-            </a:lvl3pPr>
-            <a:lvl4pPr marL="1371600" indent="0">
-              <a:buNone/>
-              <a:defRPr sz="2000"/>
-            </a:lvl4pPr>
-            <a:lvl5pPr marL="1828800" indent="0">
-              <a:buNone/>
-              <a:defRPr sz="2000"/>
-            </a:lvl5pPr>
-            <a:lvl6pPr marL="2286000" indent="0">
-              <a:buNone/>
-              <a:defRPr sz="2000"/>
-            </a:lvl6pPr>
-            <a:lvl7pPr marL="2743200" indent="0">
-              <a:buNone/>
-              <a:defRPr sz="2000"/>
-            </a:lvl7pPr>
-            <a:lvl8pPr marL="3200400" indent="0">
-              <a:buNone/>
-              <a:defRPr sz="2000"/>
-            </a:lvl8pPr>
-            <a:lvl9pPr marL="3657600" indent="0">
-              <a:buNone/>
-              <a:defRPr sz="2000"/>
-            </a:lvl9pPr>
-          </a:lstStyle>
-          <a:p>
-            <a:r>
-              <a:rPr lang="en-US" smtClean="0"/>
-              <a:t>Click icon to add picture</a:t>
-            </a:r>
-            <a:endParaRPr lang="en-US" dirty="0"/>
-          </a:p>
-        </p:txBody>
-      </p:sp>
-      <p:sp>
-        <p:nvSpPr>
-          <p:cNvPr id="4" name="Text Placeholder 3"/>
-          <p:cNvSpPr>
-            <a:spLocks noGrp="1"/>
-          </p:cNvSpPr>
-          <p:nvPr>
-            <p:ph type="body" sz="half" idx="2" hasCustomPrompt="1"/>
-          </p:nvPr>
-        </p:nvSpPr>
-        <p:spPr>
-          <a:xfrm>
-            <a:off x="533400" y="6248400"/>
-            <a:ext cx="8153400" cy="347662"/>
-          </a:xfrm>
-        </p:spPr>
-        <p:txBody>
-          <a:bodyPr/>
-          <a:lstStyle>
-            <a:lvl1pPr marL="0" indent="0">
-              <a:buNone/>
-              <a:defRPr sz="1400"/>
-            </a:lvl1pPr>
-            <a:lvl2pPr marL="457200" indent="0">
-              <a:buNone/>
-              <a:defRPr sz="1200"/>
-            </a:lvl2pPr>
-            <a:lvl3pPr marL="914400" indent="0">
-              <a:buNone/>
-              <a:defRPr sz="1000"/>
-            </a:lvl3pPr>
-            <a:lvl4pPr marL="1371600" indent="0">
-              <a:buNone/>
-              <a:defRPr sz="900"/>
-            </a:lvl4pPr>
-            <a:lvl5pPr marL="1828800" indent="0">
-              <a:buNone/>
-              <a:defRPr sz="900"/>
-            </a:lvl5pPr>
-            <a:lvl6pPr marL="2286000" indent="0">
-              <a:buNone/>
-              <a:defRPr sz="900"/>
-            </a:lvl6pPr>
-            <a:lvl7pPr marL="2743200" indent="0">
-              <a:buNone/>
-              <a:defRPr sz="900"/>
-            </a:lvl7pPr>
-            <a:lvl8pPr marL="3200400" indent="0">
-              <a:buNone/>
-              <a:defRPr sz="900"/>
-            </a:lvl8pPr>
-            <a:lvl9pPr marL="3657600" indent="0">
-              <a:buNone/>
-              <a:defRPr sz="900"/>
-            </a:lvl9pPr>
-          </a:lstStyle>
-          <a:p>
-            <a:pPr lvl="0"/>
-            <a:r>
-              <a:rPr lang="en-US" dirty="0" smtClean="0"/>
-              <a:t>Insert caption here</a:t>
-            </a:r>
-          </a:p>
-        </p:txBody>
-      </p:sp>
-      <p:pic>
-        <p:nvPicPr>
-          <p:cNvPr id="5" name="Picture 4" descr="Dickinson_hoefler_186.eps"/>
-          <p:cNvPicPr>
-            <a:picLocks noChangeAspect="1"/>
-          </p:cNvPicPr>
-          <p:nvPr userDrawn="1"/>
-        </p:nvPicPr>
-        <p:blipFill>
-          <a:blip r:embed="rId2" cstate="print">
-            <a:extLst>
-              <a:ext uri="{28A0092B-C50C-407E-A947-70E740481C1C}">
-                <a14:useLocalDpi xmlns:a14="http://schemas.microsoft.com/office/drawing/2010/main" val="0"/>
-              </a:ext>
-            </a:extLst>
-          </a:blip>
-          <a:stretch>
-            <a:fillRect/>
-          </a:stretch>
-        </p:blipFill>
-        <p:spPr>
-          <a:xfrm>
-            <a:off x="593100" y="379361"/>
-            <a:ext cx="1566913" cy="309045"/>
-          </a:xfrm>
-          <a:prstGeom prst="rect">
-            <a:avLst/>
-          </a:prstGeom>
-        </p:spPr>
-      </p:pic>
-      <p:sp>
-        <p:nvSpPr>
-          <p:cNvPr id="6" name="Title 1"/>
-          <p:cNvSpPr>
-            <a:spLocks noGrp="1"/>
-          </p:cNvSpPr>
-          <p:nvPr>
-            <p:ph type="title" hasCustomPrompt="1"/>
-          </p:nvPr>
-        </p:nvSpPr>
-        <p:spPr>
-          <a:xfrm>
-            <a:off x="533400" y="1066800"/>
-            <a:ext cx="8153400" cy="457200"/>
-          </a:xfrm>
-        </p:spPr>
-        <p:txBody>
-          <a:bodyPr/>
-          <a:lstStyle>
-            <a:lvl1pPr>
-              <a:defRPr sz="2800"/>
-            </a:lvl1pPr>
-          </a:lstStyle>
-          <a:p>
-            <a:r>
-              <a:rPr lang="en-US" dirty="0" smtClean="0"/>
-              <a:t>Slide Title</a:t>
-            </a:r>
-            <a:br>
-              <a:rPr lang="en-US" dirty="0" smtClean="0"/>
-            </a:br>
-            <a:endParaRPr lang="en-US" dirty="0"/>
-          </a:p>
-        </p:txBody>
-      </p:sp>
-    </p:spTree>
-  </p:cSld>
-  <p:clrMapOvr>
-    <a:masterClrMapping/>
-  </p:clrMapOvr>
-</p:sldLayout>
-</file>
-
-<file path=ppt/slideLayouts/slideLayout9.xml><?xml version="1.0" encoding="utf-8"?>
-<p:sldLayout xmlns:a="http://schemas.openxmlformats.org/drawingml/2006/main" xmlns:r="http://schemas.openxmlformats.org/officeDocument/2006/relationships" xmlns:p="http://schemas.openxmlformats.org/presentationml/2006/main" type="blank" preserve="1">
-  <p:cSld name="Blank -- Insert the Elements You Need">
-    <p:spTree>
-      <p:nvGrpSpPr>
-        <p:cNvPr id="1" name=""/>
-        <p:cNvGrpSpPr/>
-        <p:nvPr/>
-      </p:nvGrpSpPr>
-      <p:grpSpPr>
-        <a:xfrm>
-          <a:off x="0" y="0"/>
-          <a:ext cx="0" cy="0"/>
-          <a:chOff x="0" y="0"/>
-          <a:chExt cx="0" cy="0"/>
-        </a:xfrm>
-      </p:grpSpPr>
-      <p:pic>
-        <p:nvPicPr>
-          <p:cNvPr id="2" name="Picture 1" descr="Dickinson_hoefler_186.eps"/>
           <p:cNvPicPr>
             <a:picLocks noChangeAspect="1"/>
           </p:cNvPicPr>
@@ -2015,11 +1024,11 @@
           <a:lstStyle/>
           <a:p>
             <a:r>
-              <a:rPr lang="en-US" dirty="0" smtClean="0"/>
+              <a:rPr lang="en-US" dirty="0"/>
               <a:t>Slide Title</a:t>
             </a:r>
             <a:br>
-              <a:rPr lang="en-US" dirty="0" smtClean="0"/>
+              <a:rPr lang="en-US" dirty="0"/>
             </a:br>
             <a:endParaRPr lang="en-US" dirty="0"/>
           </a:p>
@@ -2052,38 +1061,37 @@
           <a:p>
             <a:pPr lvl="0"/>
             <a:r>
-              <a:rPr lang="en-US" dirty="0" smtClean="0"/>
+              <a:rPr lang="en-US" dirty="0"/>
               <a:t>Insert text here</a:t>
             </a:r>
           </a:p>
           <a:p>
             <a:pPr lvl="1"/>
             <a:r>
-              <a:rPr lang="en-US" dirty="0" smtClean="0"/>
+              <a:rPr lang="en-US" dirty="0"/>
               <a:t>List first level</a:t>
             </a:r>
           </a:p>
           <a:p>
             <a:pPr lvl="2"/>
             <a:r>
-              <a:rPr lang="en-US" dirty="0" smtClean="0"/>
+              <a:rPr lang="en-US" dirty="0"/>
               <a:t>List second level</a:t>
             </a:r>
           </a:p>
           <a:p>
             <a:pPr lvl="3"/>
             <a:r>
-              <a:rPr lang="en-US" dirty="0" smtClean="0"/>
+              <a:rPr lang="en-US" dirty="0"/>
               <a:t>List third level</a:t>
             </a:r>
           </a:p>
           <a:p>
             <a:pPr lvl="4"/>
             <a:r>
-              <a:rPr lang="en-US" dirty="0" smtClean="0"/>
+              <a:rPr lang="en-US" dirty="0"/>
               <a:t>List fourth level</a:t>
             </a:r>
-            <a:endParaRPr lang="en-US" dirty="0"/>
           </a:p>
         </p:txBody>
       </p:sp>
@@ -2092,14 +1100,7 @@
   <p:clrMap bg1="lt1" tx1="dk1" bg2="lt2" tx2="dk2" accent1="accent1" accent2="accent2" accent3="accent3" accent4="accent4" accent5="accent5" accent6="accent6" hlink="hlink" folHlink="folHlink"/>
   <p:sldLayoutIdLst>
     <p:sldLayoutId id="2147483649" r:id="rId1"/>
-    <p:sldLayoutId id="2147483650" r:id="rId2"/>
-    <p:sldLayoutId id="2147483661" r:id="rId3"/>
-    <p:sldLayoutId id="2147483651" r:id="rId4"/>
-    <p:sldLayoutId id="2147483658" r:id="rId5"/>
-    <p:sldLayoutId id="2147483660" r:id="rId6"/>
-    <p:sldLayoutId id="2147483654" r:id="rId7"/>
-    <p:sldLayoutId id="2147483657" r:id="rId8"/>
-    <p:sldLayoutId id="2147483655" r:id="rId9"/>
+    <p:sldLayoutId id="2147483658" r:id="rId2"/>
   </p:sldLayoutIdLst>
   <p:txStyles>
     <p:titleStyle>
@@ -2355,6 +1356,570 @@
     </p:otherStyle>
   </p:txStyles>
 </p:sldMaster>
+</file>
+
+<file path=ppt/slides/slide1.xml><?xml version="1.0" encoding="utf-8"?>
+<p:sld xmlns:a="http://schemas.openxmlformats.org/drawingml/2006/main" xmlns:r="http://schemas.openxmlformats.org/officeDocument/2006/relationships" xmlns:p="http://schemas.openxmlformats.org/presentationml/2006/main">
+  <p:cSld>
+    <p:spTree>
+      <p:nvGrpSpPr>
+        <p:cNvPr id="1" name=""/>
+        <p:cNvGrpSpPr/>
+        <p:nvPr/>
+      </p:nvGrpSpPr>
+      <p:grpSpPr>
+        <a:xfrm>
+          <a:off x="0" y="0"/>
+          <a:ext cx="0" cy="0"/>
+          <a:chOff x="0" y="0"/>
+          <a:chExt cx="0" cy="0"/>
+        </a:xfrm>
+      </p:grpSpPr>
+      <p:sp>
+        <p:nvSpPr>
+          <p:cNvPr id="2" name="제목 1">
+            <a:extLst>
+              <a:ext uri="{FF2B5EF4-FFF2-40B4-BE49-F238E27FC236}">
+                <a16:creationId xmlns:a16="http://schemas.microsoft.com/office/drawing/2014/main" id="{5E22EC78-AED9-49BB-BFCC-BC7615A95D65}"/>
+              </a:ext>
+            </a:extLst>
+          </p:cNvPr>
+          <p:cNvSpPr>
+            <a:spLocks noGrp="1"/>
+          </p:cNvSpPr>
+          <p:nvPr>
+            <p:ph type="ctrTitle"/>
+          </p:nvPr>
+        </p:nvSpPr>
+        <p:spPr/>
+        <p:txBody>
+          <a:bodyPr/>
+          <a:lstStyle/>
+          <a:p>
+            <a:r>
+              <a:rPr lang="en-US" altLang="ko-KR" dirty="0"/>
+              <a:t>The title	</a:t>
+            </a:r>
+            <a:endParaRPr lang="ko-KR" altLang="en-US" dirty="0"/>
+          </a:p>
+        </p:txBody>
+      </p:sp>
+      <p:sp>
+        <p:nvSpPr>
+          <p:cNvPr id="3" name="부제목 2">
+            <a:extLst>
+              <a:ext uri="{FF2B5EF4-FFF2-40B4-BE49-F238E27FC236}">
+                <a16:creationId xmlns:a16="http://schemas.microsoft.com/office/drawing/2014/main" id="{79400465-F2F8-4EC3-BE4B-AFB673CA558C}"/>
+              </a:ext>
+            </a:extLst>
+          </p:cNvPr>
+          <p:cNvSpPr>
+            <a:spLocks noGrp="1"/>
+          </p:cNvSpPr>
+          <p:nvPr>
+            <p:ph type="subTitle" idx="1"/>
+          </p:nvPr>
+        </p:nvSpPr>
+        <p:spPr/>
+        <p:txBody>
+          <a:bodyPr/>
+          <a:lstStyle/>
+          <a:p>
+            <a:r>
+              <a:rPr lang="en-US" altLang="ko-KR" dirty="0"/>
+              <a:t>John Doe</a:t>
+            </a:r>
+          </a:p>
+          <a:p>
+            <a:r>
+              <a:rPr lang="en-US" altLang="ko-KR" dirty="0"/>
+              <a:t>2024-09-01</a:t>
+            </a:r>
+          </a:p>
+          <a:p>
+            <a:r>
+              <a:rPr lang="en-US" altLang="ko-KR" dirty="0"/>
+              <a:t>For test purpose only</a:t>
+            </a:r>
+            <a:endParaRPr lang="ko-KR" altLang="en-US" dirty="0"/>
+          </a:p>
+        </p:txBody>
+      </p:sp>
+    </p:spTree>
+    <p:extLst>
+      <p:ext uri="{BB962C8B-B14F-4D97-AF65-F5344CB8AC3E}">
+        <p14:creationId xmlns:p14="http://schemas.microsoft.com/office/powerpoint/2010/main" val="3880582581"/>
+      </p:ext>
+    </p:extLst>
+  </p:cSld>
+  <p:clrMapOvr>
+    <a:masterClrMapping/>
+  </p:clrMapOvr>
+</p:sld>
+</file>
+
+<file path=ppt/slides/slide2.xml><?xml version="1.0" encoding="utf-8"?>
+<p:sld xmlns:a="http://schemas.openxmlformats.org/drawingml/2006/main" xmlns:r="http://schemas.openxmlformats.org/officeDocument/2006/relationships" xmlns:p="http://schemas.openxmlformats.org/presentationml/2006/main">
+  <p:cSld>
+    <p:spTree>
+      <p:nvGrpSpPr>
+        <p:cNvPr id="1" name=""/>
+        <p:cNvGrpSpPr/>
+        <p:nvPr/>
+      </p:nvGrpSpPr>
+      <p:grpSpPr>
+        <a:xfrm>
+          <a:off x="0" y="0"/>
+          <a:ext cx="0" cy="0"/>
+          <a:chOff x="0" y="0"/>
+          <a:chExt cx="0" cy="0"/>
+        </a:xfrm>
+      </p:grpSpPr>
+      <p:sp>
+        <p:nvSpPr>
+          <p:cNvPr id="2" name="제목 1">
+            <a:extLst>
+              <a:ext uri="{FF2B5EF4-FFF2-40B4-BE49-F238E27FC236}">
+                <a16:creationId xmlns:a16="http://schemas.microsoft.com/office/drawing/2014/main" id="{1AD00048-DF5A-42F2-A0AC-C8805DCF851B}"/>
+              </a:ext>
+            </a:extLst>
+          </p:cNvPr>
+          <p:cNvSpPr>
+            <a:spLocks noGrp="1"/>
+          </p:cNvSpPr>
+          <p:nvPr>
+            <p:ph type="title"/>
+          </p:nvPr>
+        </p:nvSpPr>
+        <p:spPr/>
+        <p:txBody>
+          <a:bodyPr/>
+          <a:lstStyle/>
+          <a:p>
+            <a:r>
+              <a:rPr lang="en-US" altLang="ko-KR" dirty="0"/>
+              <a:t>The Title</a:t>
+            </a:r>
+            <a:endParaRPr lang="ko-KR" altLang="en-US" dirty="0"/>
+          </a:p>
+        </p:txBody>
+      </p:sp>
+      <p:sp>
+        <p:nvSpPr>
+          <p:cNvPr id="3" name="내용 개체 틀 2">
+            <a:extLst>
+              <a:ext uri="{FF2B5EF4-FFF2-40B4-BE49-F238E27FC236}">
+                <a16:creationId xmlns:a16="http://schemas.microsoft.com/office/drawing/2014/main" id="{12E87729-A412-467E-9855-8E5ED6732CD5}"/>
+              </a:ext>
+            </a:extLst>
+          </p:cNvPr>
+          <p:cNvSpPr>
+            <a:spLocks noGrp="1"/>
+          </p:cNvSpPr>
+          <p:nvPr>
+            <p:ph idx="1"/>
+          </p:nvPr>
+        </p:nvSpPr>
+        <p:spPr/>
+        <p:txBody>
+          <a:bodyPr/>
+          <a:lstStyle/>
+          <a:p>
+            <a:r>
+              <a:rPr lang="en-US" altLang="ko-KR" dirty="0"/>
+              <a:t>Lorem ipsum dolor sit </a:t>
+            </a:r>
+            <a:r>
+              <a:rPr lang="en-US" altLang="ko-KR" dirty="0" err="1"/>
+              <a:t>amet</a:t>
+            </a:r>
+            <a:r>
+              <a:rPr lang="en-US" altLang="ko-KR" dirty="0"/>
+              <a:t>, </a:t>
+            </a:r>
+            <a:r>
+              <a:rPr lang="en-US" altLang="ko-KR" dirty="0" err="1"/>
+              <a:t>consectetur</a:t>
+            </a:r>
+            <a:r>
+              <a:rPr lang="en-US" altLang="ko-KR" dirty="0"/>
+              <a:t> </a:t>
+            </a:r>
+            <a:r>
+              <a:rPr lang="en-US" altLang="ko-KR" dirty="0" err="1"/>
+              <a:t>adipiscing</a:t>
+            </a:r>
+            <a:r>
+              <a:rPr lang="en-US" altLang="ko-KR" dirty="0"/>
+              <a:t> </a:t>
+            </a:r>
+            <a:r>
+              <a:rPr lang="en-US" altLang="ko-KR" dirty="0" err="1"/>
+              <a:t>elit</a:t>
+            </a:r>
+            <a:r>
+              <a:rPr lang="en-US" altLang="ko-KR" dirty="0"/>
+              <a:t>. Morbi </a:t>
+            </a:r>
+            <a:r>
+              <a:rPr lang="en-US" altLang="ko-KR" dirty="0" err="1"/>
+              <a:t>pellentesque</a:t>
+            </a:r>
+            <a:r>
+              <a:rPr lang="en-US" altLang="ko-KR" dirty="0"/>
+              <a:t> id </a:t>
+            </a:r>
+            <a:r>
+              <a:rPr lang="en-US" altLang="ko-KR" dirty="0" err="1"/>
+              <a:t>est</a:t>
+            </a:r>
+            <a:r>
+              <a:rPr lang="en-US" altLang="ko-KR" dirty="0"/>
+              <a:t> id </a:t>
+            </a:r>
+            <a:r>
+              <a:rPr lang="en-US" altLang="ko-KR" dirty="0" err="1"/>
+              <a:t>viverra</a:t>
+            </a:r>
+            <a:r>
+              <a:rPr lang="en-US" altLang="ko-KR" dirty="0"/>
+              <a:t>.</a:t>
+            </a:r>
+          </a:p>
+          <a:p>
+            <a:pPr marL="342900" indent="-342900">
+              <a:buFont typeface="Arial" panose="020B0604020202020204" pitchFamily="34" charset="0"/>
+              <a:buChar char="•"/>
+            </a:pPr>
+            <a:r>
+              <a:rPr lang="en-US" altLang="ko-KR" dirty="0"/>
+              <a:t>Cras </a:t>
+            </a:r>
+            <a:r>
+              <a:rPr lang="en-US" altLang="ko-KR" dirty="0" err="1"/>
+              <a:t>imperdiet</a:t>
+            </a:r>
+            <a:r>
+              <a:rPr lang="en-US" altLang="ko-KR" dirty="0"/>
+              <a:t> pharetra </a:t>
+            </a:r>
+            <a:r>
+              <a:rPr lang="en-US" altLang="ko-KR" dirty="0" err="1"/>
+              <a:t>orci</a:t>
+            </a:r>
+            <a:r>
+              <a:rPr lang="en-US" altLang="ko-KR" dirty="0"/>
+              <a:t> </a:t>
+            </a:r>
+            <a:r>
+              <a:rPr lang="en-US" altLang="ko-KR" dirty="0" err="1"/>
+              <a:t>eget</a:t>
+            </a:r>
+            <a:r>
+              <a:rPr lang="en-US" altLang="ko-KR" dirty="0"/>
+              <a:t> </a:t>
+            </a:r>
+            <a:r>
+              <a:rPr lang="en-US" altLang="ko-KR" dirty="0" err="1"/>
+              <a:t>egestas</a:t>
+            </a:r>
+            <a:r>
+              <a:rPr lang="en-US" altLang="ko-KR" dirty="0"/>
+              <a:t>.</a:t>
+            </a:r>
+          </a:p>
+          <a:p>
+            <a:pPr marL="1085850" lvl="1" indent="-342900"/>
+            <a:r>
+              <a:rPr lang="en-US" altLang="ko-KR" dirty="0"/>
+              <a:t>Sed </a:t>
+            </a:r>
+            <a:r>
+              <a:rPr lang="en-US" altLang="ko-KR" dirty="0" err="1"/>
+              <a:t>auctor</a:t>
+            </a:r>
+            <a:r>
+              <a:rPr lang="en-US" altLang="ko-KR" dirty="0"/>
+              <a:t> vestibulum </a:t>
+            </a:r>
+            <a:r>
+              <a:rPr lang="en-US" altLang="ko-KR" dirty="0" err="1"/>
+              <a:t>leo</a:t>
+            </a:r>
+            <a:r>
+              <a:rPr lang="en-US" altLang="ko-KR" dirty="0"/>
+              <a:t> sit </a:t>
+            </a:r>
+            <a:r>
+              <a:rPr lang="en-US" altLang="ko-KR" dirty="0" err="1"/>
+              <a:t>amet</a:t>
+            </a:r>
+            <a:r>
+              <a:rPr lang="en-US" altLang="ko-KR" dirty="0"/>
+              <a:t> </a:t>
+            </a:r>
+            <a:r>
+              <a:rPr lang="en-US" altLang="ko-KR" dirty="0" err="1"/>
+              <a:t>mollis</a:t>
+            </a:r>
+            <a:r>
+              <a:rPr lang="en-US" altLang="ko-KR" dirty="0"/>
+              <a:t>.</a:t>
+            </a:r>
+          </a:p>
+          <a:p>
+            <a:pPr marL="1085850" lvl="1" indent="-342900"/>
+            <a:r>
+              <a:rPr lang="en-US" altLang="ko-KR" dirty="0" err="1"/>
+              <a:t>Vivamus</a:t>
+            </a:r>
+            <a:r>
+              <a:rPr lang="en-US" altLang="ko-KR" dirty="0"/>
+              <a:t> vitae mi et </a:t>
+            </a:r>
+            <a:r>
+              <a:rPr lang="en-US" altLang="ko-KR" dirty="0" err="1"/>
+              <a:t>lectus</a:t>
+            </a:r>
+            <a:r>
+              <a:rPr lang="en-US" altLang="ko-KR" dirty="0"/>
+              <a:t> </a:t>
+            </a:r>
+            <a:r>
+              <a:rPr lang="en-US" altLang="ko-KR" dirty="0" err="1"/>
+              <a:t>dapibus</a:t>
+            </a:r>
+            <a:r>
+              <a:rPr lang="en-US" altLang="ko-KR" dirty="0"/>
+              <a:t> maximus.</a:t>
+            </a:r>
+          </a:p>
+          <a:p>
+            <a:pPr marL="1485900" lvl="2" indent="-342900"/>
+            <a:r>
+              <a:rPr lang="en-US" altLang="ko-KR" dirty="0"/>
+              <a:t>Integer id </a:t>
+            </a:r>
+            <a:r>
+              <a:rPr lang="en-US" altLang="ko-KR" dirty="0" err="1"/>
+              <a:t>finibus</a:t>
+            </a:r>
+            <a:r>
+              <a:rPr lang="en-US" altLang="ko-KR" dirty="0"/>
+              <a:t> ante, </a:t>
+            </a:r>
+            <a:r>
+              <a:rPr lang="en-US" altLang="ko-KR" dirty="0" err="1"/>
+              <a:t>ut</a:t>
+            </a:r>
+            <a:r>
+              <a:rPr lang="en-US" altLang="ko-KR" dirty="0"/>
+              <a:t> </a:t>
+            </a:r>
+            <a:r>
+              <a:rPr lang="en-US" altLang="ko-KR" dirty="0" err="1"/>
+              <a:t>tempor</a:t>
+            </a:r>
+            <a:r>
+              <a:rPr lang="en-US" altLang="ko-KR" dirty="0"/>
+              <a:t> </a:t>
+            </a:r>
+            <a:r>
+              <a:rPr lang="en-US" altLang="ko-KR" dirty="0" err="1"/>
+              <a:t>odio</a:t>
+            </a:r>
+            <a:r>
+              <a:rPr lang="en-US" altLang="ko-KR" dirty="0"/>
+              <a:t>.</a:t>
+            </a:r>
+          </a:p>
+          <a:p>
+            <a:pPr lvl="2" indent="0">
+              <a:buNone/>
+            </a:pPr>
+            <a:endParaRPr lang="en-US" altLang="ko-KR" dirty="0"/>
+          </a:p>
+          <a:p>
+            <a:r>
+              <a:rPr lang="en-US" altLang="ko-KR" dirty="0" err="1"/>
+              <a:t>Curabitur</a:t>
+            </a:r>
+            <a:r>
+              <a:rPr lang="en-US" altLang="ko-KR" dirty="0"/>
+              <a:t> </a:t>
+            </a:r>
+            <a:r>
+              <a:rPr lang="en-US" altLang="ko-KR" dirty="0" err="1"/>
+              <a:t>ut</a:t>
+            </a:r>
+            <a:r>
+              <a:rPr lang="en-US" altLang="ko-KR" dirty="0"/>
+              <a:t> </a:t>
+            </a:r>
+            <a:r>
+              <a:rPr lang="en-US" altLang="ko-KR" dirty="0" err="1"/>
+              <a:t>venenatis</a:t>
+            </a:r>
+            <a:r>
+              <a:rPr lang="en-US" altLang="ko-KR" dirty="0"/>
+              <a:t> </a:t>
+            </a:r>
+            <a:r>
+              <a:rPr lang="en-US" altLang="ko-KR" dirty="0" err="1"/>
+              <a:t>quam</a:t>
+            </a:r>
+            <a:r>
+              <a:rPr lang="en-US" altLang="ko-KR" dirty="0"/>
+              <a:t>.</a:t>
+            </a:r>
+          </a:p>
+          <a:p>
+            <a:pPr marL="457200" indent="-457200">
+              <a:buFont typeface="+mj-lt"/>
+              <a:buAutoNum type="arabicPeriod"/>
+            </a:pPr>
+            <a:r>
+              <a:rPr lang="en-US" altLang="ko-KR" dirty="0"/>
+              <a:t>Duis </a:t>
+            </a:r>
+            <a:r>
+              <a:rPr lang="en-US" altLang="ko-KR" dirty="0" err="1"/>
+              <a:t>fringilla</a:t>
+            </a:r>
+            <a:r>
+              <a:rPr lang="en-US" altLang="ko-KR" dirty="0"/>
+              <a:t> </a:t>
+            </a:r>
+            <a:r>
+              <a:rPr lang="en-US" altLang="ko-KR" dirty="0" err="1"/>
+              <a:t>orci</a:t>
+            </a:r>
+            <a:r>
+              <a:rPr lang="en-US" altLang="ko-KR" dirty="0"/>
+              <a:t> at </a:t>
+            </a:r>
+            <a:r>
+              <a:rPr lang="en-US" altLang="ko-KR" dirty="0" err="1"/>
+              <a:t>facilisis</a:t>
+            </a:r>
+            <a:r>
+              <a:rPr lang="en-US" altLang="ko-KR" dirty="0"/>
+              <a:t> tempus.</a:t>
+            </a:r>
+          </a:p>
+          <a:p>
+            <a:pPr marL="457200" indent="-457200">
+              <a:buFont typeface="+mj-lt"/>
+              <a:buAutoNum type="arabicPeriod"/>
+            </a:pPr>
+            <a:r>
+              <a:rPr lang="en-US" altLang="ko-KR" dirty="0"/>
+              <a:t>Cras a </a:t>
+            </a:r>
+            <a:r>
+              <a:rPr lang="en-US" altLang="ko-KR" dirty="0" err="1"/>
+              <a:t>vehicula</a:t>
+            </a:r>
+            <a:r>
+              <a:rPr lang="en-US" altLang="ko-KR" dirty="0"/>
+              <a:t> dolor. </a:t>
+            </a:r>
+          </a:p>
+          <a:p>
+            <a:pPr marL="1200150" lvl="1" indent="-457200">
+              <a:buFont typeface="+mj-lt"/>
+              <a:buAutoNum type="arabicPeriod"/>
+            </a:pPr>
+            <a:r>
+              <a:rPr lang="en-US" altLang="ko-KR" dirty="0" err="1"/>
+              <a:t>Donec</a:t>
+            </a:r>
+            <a:r>
+              <a:rPr lang="en-US" altLang="ko-KR" dirty="0"/>
+              <a:t> </a:t>
+            </a:r>
+            <a:r>
+              <a:rPr lang="en-US" altLang="ko-KR" dirty="0" err="1"/>
+              <a:t>consequat</a:t>
+            </a:r>
+            <a:r>
+              <a:rPr lang="en-US" altLang="ko-KR" dirty="0"/>
+              <a:t> dolor sed </a:t>
+            </a:r>
+            <a:r>
+              <a:rPr lang="en-US" altLang="ko-KR" dirty="0" err="1"/>
+              <a:t>tellus</a:t>
+            </a:r>
+            <a:r>
+              <a:rPr lang="en-US" altLang="ko-KR" dirty="0"/>
+              <a:t> </a:t>
+            </a:r>
+            <a:r>
+              <a:rPr lang="en-US" altLang="ko-KR" dirty="0" err="1"/>
+              <a:t>ullamcorper</a:t>
+            </a:r>
+            <a:r>
+              <a:rPr lang="en-US" altLang="ko-KR" dirty="0"/>
+              <a:t> </a:t>
+            </a:r>
+            <a:r>
+              <a:rPr lang="en-US" altLang="ko-KR" dirty="0" err="1"/>
+              <a:t>ullamcorper</a:t>
+            </a:r>
+            <a:r>
+              <a:rPr lang="en-US" altLang="ko-KR" dirty="0"/>
+              <a:t>.</a:t>
+            </a:r>
+            <a:endParaRPr lang="ko-KR" altLang="en-US" dirty="0"/>
+          </a:p>
+        </p:txBody>
+      </p:sp>
+      <p:sp>
+        <p:nvSpPr>
+          <p:cNvPr id="4" name="텍스트 개체 틀 3">
+            <a:extLst>
+              <a:ext uri="{FF2B5EF4-FFF2-40B4-BE49-F238E27FC236}">
+                <a16:creationId xmlns:a16="http://schemas.microsoft.com/office/drawing/2014/main" id="{0F2779D6-0CF7-4E57-A9B0-16434D2B095C}"/>
+              </a:ext>
+            </a:extLst>
+          </p:cNvPr>
+          <p:cNvSpPr>
+            <a:spLocks noGrp="1"/>
+          </p:cNvSpPr>
+          <p:nvPr>
+            <p:ph type="body" sz="half" idx="2"/>
+          </p:nvPr>
+        </p:nvSpPr>
+        <p:spPr/>
+        <p:txBody>
+          <a:bodyPr/>
+          <a:lstStyle/>
+          <a:p>
+            <a:r>
+              <a:rPr lang="en-US" altLang="ko-KR" dirty="0"/>
+              <a:t>Note : generated text from </a:t>
+            </a:r>
+            <a:r>
+              <a:rPr lang="en-US" altLang="ko-KR" dirty="0">
+                <a:hlinkClick r:id="rId2"/>
+              </a:rPr>
+              <a:t>https://www.lipsum.com/</a:t>
+            </a:r>
+            <a:endParaRPr lang="en-US" altLang="ko-KR" dirty="0"/>
+          </a:p>
+        </p:txBody>
+      </p:sp>
+    </p:spTree>
+    <p:extLst>
+      <p:ext uri="{BB962C8B-B14F-4D97-AF65-F5344CB8AC3E}">
+        <p14:creationId xmlns:p14="http://schemas.microsoft.com/office/powerpoint/2010/main" val="3941739656"/>
+      </p:ext>
+    </p:extLst>
+  </p:cSld>
+  <p:clrMapOvr>
+    <a:masterClrMapping/>
+  </p:clrMapOvr>
+</p:sld>
 </file>
 
 <file path=ppt/theme/theme1.xml><?xml version="1.0" encoding="utf-8"?>

</xml_diff>